<commit_message>
added wee kim slides
</commit_message>
<xml_diff>
--- a/SWEN presentation 3.pptx
+++ b/SWEN presentation 3.pptx
@@ -11760,8 +11760,16 @@
               <a:buAutoNum type="arabicPeriod"/>
             </a:pPr>
             <a:r>
+              <a:rPr lang="en" sz="1800" dirty="0"/>
+              <a:t>See </a:t>
+            </a:r>
+            <a:r>
+              <a:rPr lang="en-SG" sz="1800"/>
+              <a:t>the </a:t>
+            </a:r>
+            <a:r>
               <a:rPr lang="en" sz="1800"/>
-              <a:t>See whole picture</a:t>
+              <a:t>whole picture</a:t>
             </a:r>
             <a:endParaRPr sz="1800" dirty="0"/>
           </a:p>

</xml_diff>